<commit_message>
update notebook + ppt
</commit_message>
<xml_diff>
--- a/TD_4/TD_simulation.pptx
+++ b/TD_4/TD_simulation.pptx
@@ -5,7 +5,7 @@
     <p:sldMasterId id="2147483648" r:id="rId1"/>
   </p:sldMasterIdLst>
   <p:notesMasterIdLst>
-    <p:notesMasterId r:id="rId8"/>
+    <p:notesMasterId r:id="rId9"/>
   </p:notesMasterIdLst>
   <p:sldIdLst>
     <p:sldId id="257" r:id="rId2"/>
@@ -14,6 +14,7 @@
     <p:sldId id="260" r:id="rId5"/>
     <p:sldId id="261" r:id="rId6"/>
     <p:sldId id="262" r:id="rId7"/>
+    <p:sldId id="263" r:id="rId8"/>
   </p:sldIdLst>
   <p:sldSz cx="9144000" cy="6858000" type="screen4x3"/>
   <p:notesSz cx="6858000" cy="9144000"/>
@@ -3810,11 +3811,6 @@
               </a:rPr>
               <a:t>TD4: reconstruction 3D et simulation</a:t>
             </a:r>
-            <a:endParaRPr lang="en-US" sz="9000" dirty="0" smtClean="0">
-              <a:solidFill>
-                <a:schemeClr val="tx1"/>
-              </a:solidFill>
-            </a:endParaRPr>
           </a:p>
           <a:p>
             <a:r>
@@ -5886,16 +5882,6 @@
               </a:rPr>
               <a:t>3D_Maize_parameters_solution.ipyn</a:t>
             </a:r>
-            <a:r>
-              <a:rPr lang="en-US" sz="2400" dirty="0" smtClean="0">
-                <a:solidFill>
-                  <a:srgbClr val="002060"/>
-                </a:solidFill>
-                <a:latin typeface="Arial" pitchFamily="34" charset="0"/>
-                <a:cs typeface="Arial" pitchFamily="34" charset="0"/>
-              </a:rPr>
-              <a:t/>
-            </a:r>
             <a:br>
               <a:rPr lang="en-US" sz="2400" dirty="0" smtClean="0">
                 <a:solidFill>
@@ -5999,49 +5985,6 @@
               </a:rPr>
               <a:t>3</a:t>
             </a:fld>
-            <a:endParaRPr lang="en-US" dirty="0">
-              <a:latin typeface="Arial" pitchFamily="34" charset="0"/>
-              <a:cs typeface="Arial" pitchFamily="34" charset="0"/>
-            </a:endParaRPr>
-          </a:p>
-        </p:txBody>
-      </p:sp>
-      <p:sp>
-        <p:nvSpPr>
-          <p:cNvPr id="8" name="Espace réservé du pied de page 7"/>
-          <p:cNvSpPr>
-            <a:spLocks noGrp="1"/>
-          </p:cNvSpPr>
-          <p:nvPr>
-            <p:ph type="ftr" sz="quarter" idx="11"/>
-          </p:nvPr>
-        </p:nvSpPr>
-        <p:spPr/>
-        <p:txBody>
-          <a:bodyPr/>
-          <a:lstStyle/>
-          <a:p>
-            <a:r>
-              <a:rPr lang="fr-FR" dirty="0" smtClean="0">
-                <a:latin typeface="Arial" pitchFamily="34" charset="0"/>
-                <a:cs typeface="Arial" pitchFamily="34" charset="0"/>
-              </a:rPr>
-              <a:t>Module doctoral  </a:t>
-            </a:r>
-            <a:r>
-              <a:rPr lang="fr-FR" dirty="0" err="1" smtClean="0">
-                <a:latin typeface="Arial" pitchFamily="34" charset="0"/>
-                <a:cs typeface="Arial" pitchFamily="34" charset="0"/>
-              </a:rPr>
-              <a:t>Agreenium</a:t>
-            </a:r>
-            <a:r>
-              <a:rPr lang="fr-FR" dirty="0" smtClean="0">
-                <a:latin typeface="Arial" pitchFamily="34" charset="0"/>
-                <a:cs typeface="Arial" pitchFamily="34" charset="0"/>
-              </a:rPr>
-              <a:t> – Modélisation structure-fonction des plantes</a:t>
-            </a:r>
             <a:endParaRPr lang="en-US" dirty="0">
               <a:latin typeface="Arial" pitchFamily="34" charset="0"/>
               <a:cs typeface="Arial" pitchFamily="34" charset="0"/>
@@ -6725,6 +6668,13 @@
   <p:clrMapOvr>
     <a:masterClrMapping/>
   </p:clrMapOvr>
+  <p:timing>
+    <p:tnLst>
+      <p:par>
+        <p:cTn id="1" dur="indefinite" restart="never" nodeType="tmRoot"/>
+      </p:par>
+    </p:tnLst>
+  </p:timing>
 </p:sld>
 </file>
 
@@ -7586,10 +7536,6 @@
               </a:rPr>
               <a:t>) puis dans un environnement choisi (latitude, densité, ciel) </a:t>
             </a:r>
-            <a:endParaRPr lang="fr-FR" sz="2400" b="1" dirty="0" smtClean="0">
-              <a:latin typeface="Arial" pitchFamily="34" charset="0"/>
-              <a:cs typeface="Arial" pitchFamily="34" charset="0"/>
-            </a:endParaRPr>
           </a:p>
           <a:p>
             <a:pPr marL="0" indent="0">
@@ -7804,6 +7750,248 @@
     <p:extLst>
       <p:ext uri="{BB962C8B-B14F-4D97-AF65-F5344CB8AC3E}">
         <p14:creationId xmlns:p14="http://schemas.microsoft.com/office/powerpoint/2010/main" val="3830009183"/>
+      </p:ext>
+    </p:extLst>
+  </p:cSld>
+  <p:clrMapOvr>
+    <a:masterClrMapping/>
+  </p:clrMapOvr>
+  <p:timing>
+    <p:tnLst>
+      <p:par>
+        <p:cTn id="1" dur="indefinite" restart="never" nodeType="tmRoot"/>
+      </p:par>
+    </p:tnLst>
+  </p:timing>
+</p:sld>
+</file>
+
+<file path=ppt/slides/slide7.xml><?xml version="1.0" encoding="utf-8"?>
+<p:sld xmlns:a="http://schemas.openxmlformats.org/drawingml/2006/main" xmlns:r="http://schemas.openxmlformats.org/officeDocument/2006/relationships" xmlns:p="http://schemas.openxmlformats.org/presentationml/2006/main">
+  <p:cSld>
+    <p:spTree>
+      <p:nvGrpSpPr>
+        <p:cNvPr id="1" name=""/>
+        <p:cNvGrpSpPr/>
+        <p:nvPr/>
+      </p:nvGrpSpPr>
+      <p:grpSpPr>
+        <a:xfrm>
+          <a:off x="0" y="0"/>
+          <a:ext cx="0" cy="0"/>
+          <a:chOff x="0" y="0"/>
+          <a:chExt cx="0" cy="0"/>
+        </a:xfrm>
+      </p:grpSpPr>
+      <p:sp>
+        <p:nvSpPr>
+          <p:cNvPr id="3" name="Espace réservé du contenu 2"/>
+          <p:cNvSpPr>
+            <a:spLocks noGrp="1"/>
+          </p:cNvSpPr>
+          <p:nvPr>
+            <p:ph idx="1"/>
+          </p:nvPr>
+        </p:nvSpPr>
+        <p:spPr/>
+        <p:txBody>
+          <a:bodyPr>
+            <a:normAutofit/>
+          </a:bodyPr>
+          <a:lstStyle/>
+          <a:p>
+            <a:pPr marL="0" indent="0">
+              <a:buNone/>
+            </a:pPr>
+            <a:r>
+              <a:rPr lang="fr-FR" sz="2400" dirty="0" smtClean="0">
+                <a:latin typeface="Arial" pitchFamily="34" charset="0"/>
+                <a:cs typeface="Arial" pitchFamily="34" charset="0"/>
+              </a:rPr>
+              <a:t>Générer un plan d’expérience (</a:t>
+            </a:r>
+            <a:r>
+              <a:rPr lang="en-US" sz="2400" dirty="0" err="1" smtClean="0">
+                <a:solidFill>
+                  <a:srgbClr val="002060"/>
+                </a:solidFill>
+                <a:latin typeface="Arial" pitchFamily="34" charset="0"/>
+                <a:cs typeface="Arial" pitchFamily="34" charset="0"/>
+              </a:rPr>
+              <a:t>plan_simulation_Morris.R</a:t>
+            </a:r>
+            <a:r>
+              <a:rPr lang="en-US" sz="2400" dirty="0" smtClean="0">
+                <a:solidFill>
+                  <a:srgbClr val="002060"/>
+                </a:solidFill>
+                <a:latin typeface="Arial" pitchFamily="34" charset="0"/>
+                <a:cs typeface="Arial" pitchFamily="34" charset="0"/>
+              </a:rPr>
+              <a:t>) </a:t>
+            </a:r>
+          </a:p>
+          <a:p>
+            <a:pPr marL="0" indent="0">
+              <a:buNone/>
+            </a:pPr>
+            <a:r>
+              <a:rPr lang="en-US" sz="2400" dirty="0" err="1">
+                <a:latin typeface="Arial" pitchFamily="34" charset="0"/>
+                <a:cs typeface="Arial" pitchFamily="34" charset="0"/>
+              </a:rPr>
+              <a:t>p</a:t>
+            </a:r>
+            <a:r>
+              <a:rPr lang="en-US" sz="2400" dirty="0" err="1" smtClean="0">
+                <a:latin typeface="Arial" pitchFamily="34" charset="0"/>
+                <a:cs typeface="Arial" pitchFamily="34" charset="0"/>
+              </a:rPr>
+              <a:t>uis</a:t>
+            </a:r>
+            <a:r>
+              <a:rPr lang="en-US" sz="2400" dirty="0" smtClean="0">
+                <a:latin typeface="Arial" pitchFamily="34" charset="0"/>
+                <a:cs typeface="Arial" pitchFamily="34" charset="0"/>
+              </a:rPr>
+              <a:t> lancer les simulations via le notebook</a:t>
+            </a:r>
+            <a:endParaRPr lang="fr-FR" sz="2400" dirty="0" smtClean="0">
+              <a:latin typeface="Arial" pitchFamily="34" charset="0"/>
+              <a:cs typeface="Arial" pitchFamily="34" charset="0"/>
+            </a:endParaRPr>
+          </a:p>
+          <a:p>
+            <a:pPr>
+              <a:buFont typeface="Wingdings" pitchFamily="2" charset="2"/>
+              <a:buChar char="Ø"/>
+            </a:pPr>
+            <a:endParaRPr lang="en-US" sz="2400" dirty="0" smtClean="0">
+              <a:latin typeface="Arial" pitchFamily="34" charset="0"/>
+              <a:cs typeface="Arial" pitchFamily="34" charset="0"/>
+            </a:endParaRPr>
+          </a:p>
+        </p:txBody>
+      </p:sp>
+      <p:sp>
+        <p:nvSpPr>
+          <p:cNvPr id="5" name="Espace réservé du numéro de diapositive 4"/>
+          <p:cNvSpPr>
+            <a:spLocks noGrp="1"/>
+          </p:cNvSpPr>
+          <p:nvPr>
+            <p:ph type="sldNum" sz="quarter" idx="12"/>
+          </p:nvPr>
+        </p:nvSpPr>
+        <p:spPr/>
+        <p:txBody>
+          <a:bodyPr/>
+          <a:lstStyle/>
+          <a:p>
+            <a:fld id="{2531D56F-F549-4EBF-B1D6-9551191C4E35}" type="slidenum">
+              <a:rPr lang="en-US" smtClean="0">
+                <a:latin typeface="Arial" pitchFamily="34" charset="0"/>
+                <a:cs typeface="Arial" pitchFamily="34" charset="0"/>
+              </a:rPr>
+              <a:t>7</a:t>
+            </a:fld>
+            <a:endParaRPr lang="en-US">
+              <a:latin typeface="Arial" pitchFamily="34" charset="0"/>
+              <a:cs typeface="Arial" pitchFamily="34" charset="0"/>
+            </a:endParaRPr>
+          </a:p>
+        </p:txBody>
+      </p:sp>
+      <p:sp>
+        <p:nvSpPr>
+          <p:cNvPr id="8" name="Rectangle 2"/>
+          <p:cNvSpPr txBox="1">
+            <a:spLocks noChangeArrowheads="1"/>
+          </p:cNvSpPr>
+          <p:nvPr/>
+        </p:nvSpPr>
+        <p:spPr>
+          <a:xfrm>
+            <a:off x="0" y="0"/>
+            <a:ext cx="9144000" cy="914400"/>
+          </a:xfrm>
+          <a:prstGeom prst="rect">
+            <a:avLst/>
+          </a:prstGeom>
+          <a:solidFill>
+            <a:schemeClr val="bg1"/>
+          </a:solidFill>
+        </p:spPr>
+        <p:txBody>
+          <a:bodyPr vert="horz" lIns="91440" tIns="45720" rIns="91440" bIns="45720" rtlCol="0" anchor="ctr">
+            <a:normAutofit/>
+          </a:bodyPr>
+          <a:lstStyle>
+            <a:lvl1pPr algn="ctr" defTabSz="914400" rtl="0" eaLnBrk="1" latinLnBrk="0" hangingPunct="1">
+              <a:spcBef>
+                <a:spcPct val="0"/>
+              </a:spcBef>
+              <a:buNone/>
+              <a:defRPr sz="4400" kern="1200">
+                <a:solidFill>
+                  <a:schemeClr val="tx1"/>
+                </a:solidFill>
+                <a:latin typeface="+mj-lt"/>
+                <a:ea typeface="+mj-ea"/>
+                <a:cs typeface="+mj-cs"/>
+              </a:defRPr>
+            </a:lvl1pPr>
+          </a:lstStyle>
+          <a:p>
+            <a:pPr>
+              <a:defRPr/>
+            </a:pPr>
+            <a:r>
+              <a:rPr lang="en-US" sz="4000" dirty="0" smtClean="0">
+                <a:latin typeface="Times New Roman" pitchFamily="18" charset="0"/>
+                <a:cs typeface="Times New Roman" pitchFamily="18" charset="0"/>
+              </a:rPr>
+              <a:t>Le </a:t>
+            </a:r>
+            <a:r>
+              <a:rPr lang="en-US" sz="4000" dirty="0" err="1" smtClean="0">
+                <a:latin typeface="Times New Roman" pitchFamily="18" charset="0"/>
+                <a:cs typeface="Times New Roman" pitchFamily="18" charset="0"/>
+              </a:rPr>
+              <a:t>modèle</a:t>
+            </a:r>
+            <a:r>
+              <a:rPr lang="en-US" sz="4000" dirty="0" smtClean="0">
+                <a:latin typeface="Times New Roman" pitchFamily="18" charset="0"/>
+                <a:cs typeface="Times New Roman" pitchFamily="18" charset="0"/>
+              </a:rPr>
+              <a:t> 3D + le </a:t>
+            </a:r>
+            <a:r>
+              <a:rPr lang="en-US" sz="4000" dirty="0" err="1" smtClean="0">
+                <a:latin typeface="Times New Roman" pitchFamily="18" charset="0"/>
+                <a:cs typeface="Times New Roman" pitchFamily="18" charset="0"/>
+              </a:rPr>
+              <a:t>modèle</a:t>
+            </a:r>
+            <a:r>
+              <a:rPr lang="en-US" sz="4000" dirty="0" smtClean="0">
+                <a:latin typeface="Times New Roman" pitchFamily="18" charset="0"/>
+                <a:cs typeface="Times New Roman" pitchFamily="18" charset="0"/>
+              </a:rPr>
+              <a:t> de lumière </a:t>
+            </a:r>
+            <a:endParaRPr lang="en-US" sz="4000" dirty="0">
+              <a:latin typeface="Times New Roman" pitchFamily="18" charset="0"/>
+              <a:cs typeface="Times New Roman" pitchFamily="18" charset="0"/>
+            </a:endParaRPr>
+          </a:p>
+        </p:txBody>
+      </p:sp>
+    </p:spTree>
+    <p:extLst>
+      <p:ext uri="{BB962C8B-B14F-4D97-AF65-F5344CB8AC3E}">
+        <p14:creationId xmlns:p14="http://schemas.microsoft.com/office/powerpoint/2010/main" val="2083695739"/>
       </p:ext>
     </p:extLst>
   </p:cSld>

</xml_diff>